<commit_message>
Nothing changed. Just test!
</commit_message>
<xml_diff>
--- a/presentations/GUI design and Class design.pptx
+++ b/presentations/GUI design and Class design.pptx
@@ -212,6 +212,7 @@
           <a:p>
             <a:fld id="{2925F9F2-4FDE-44AC-80E8-AF44FAB92E73}" type="datetimeFigureOut">
               <a:rPr lang="en-US" smtClean="0"/>
+              <a:pPr/>
               <a:t>12.04.04</a:t>
             </a:fld>
             <a:endParaRPr lang="en-US"/>
@@ -373,6 +374,7 @@
           <a:p>
             <a:fld id="{35178A42-6CAF-42E9-AB2D-6B35B30F15C5}" type="slidenum">
               <a:rPr lang="en-US" smtClean="0"/>
+              <a:pPr/>
               <a:t>‹#›</a:t>
             </a:fld>
             <a:endParaRPr lang="en-US"/>
@@ -544,6 +546,7 @@
           <a:p>
             <a:fld id="{35178A42-6CAF-42E9-AB2D-6B35B30F15C5}" type="slidenum">
               <a:rPr lang="en-US" smtClean="0"/>
+              <a:pPr/>
               <a:t>11</a:t>
             </a:fld>
             <a:endParaRPr lang="en-US"/>
@@ -1217,7 +1220,7 @@
             <a:fld id="{26F449B0-83EA-4872-896A-89F03A2C0A3C}" type="datetimeFigureOut">
               <a:rPr lang="en-US" smtClean="0"/>
               <a:pPr/>
-              <a:t>12.04.03</a:t>
+              <a:t>12.04.04</a:t>
             </a:fld>
             <a:endParaRPr lang="en-US"/>
           </a:p>
@@ -1402,7 +1405,7 @@
             <a:fld id="{26F449B0-83EA-4872-896A-89F03A2C0A3C}" type="datetimeFigureOut">
               <a:rPr lang="en-US" smtClean="0"/>
               <a:pPr/>
-              <a:t>12.04.03</a:t>
+              <a:t>12.04.04</a:t>
             </a:fld>
             <a:endParaRPr lang="en-US"/>
           </a:p>
@@ -1579,7 +1582,7 @@
             <a:fld id="{26F449B0-83EA-4872-896A-89F03A2C0A3C}" type="datetimeFigureOut">
               <a:rPr lang="en-US" smtClean="0"/>
               <a:pPr/>
-              <a:t>12.04.03</a:t>
+              <a:t>12.04.04</a:t>
             </a:fld>
             <a:endParaRPr lang="en-US"/>
           </a:p>
@@ -1746,7 +1749,7 @@
             <a:fld id="{26F449B0-83EA-4872-896A-89F03A2C0A3C}" type="datetimeFigureOut">
               <a:rPr lang="en-US" smtClean="0"/>
               <a:pPr/>
-              <a:t>12.04.03</a:t>
+              <a:t>12.04.04</a:t>
             </a:fld>
             <a:endParaRPr lang="en-US"/>
           </a:p>
@@ -1969,7 +1972,7 @@
             <a:fld id="{26F449B0-83EA-4872-896A-89F03A2C0A3C}" type="datetimeFigureOut">
               <a:rPr lang="en-US" smtClean="0"/>
               <a:pPr/>
-              <a:t>12.04.03</a:t>
+              <a:t>12.04.04</a:t>
             </a:fld>
             <a:endParaRPr lang="en-US"/>
           </a:p>
@@ -2230,7 +2233,7 @@
             <a:fld id="{26F449B0-83EA-4872-896A-89F03A2C0A3C}" type="datetimeFigureOut">
               <a:rPr lang="en-US" smtClean="0"/>
               <a:pPr/>
-              <a:t>12.04.03</a:t>
+              <a:t>12.04.04</a:t>
             </a:fld>
             <a:endParaRPr lang="en-US"/>
           </a:p>
@@ -2636,7 +2639,7 @@
             <a:fld id="{26F449B0-83EA-4872-896A-89F03A2C0A3C}" type="datetimeFigureOut">
               <a:rPr lang="en-US" smtClean="0"/>
               <a:pPr/>
-              <a:t>12.04.03</a:t>
+              <a:t>12.04.04</a:t>
             </a:fld>
             <a:endParaRPr lang="en-US"/>
           </a:p>
@@ -2769,7 +2772,7 @@
             <a:fld id="{26F449B0-83EA-4872-896A-89F03A2C0A3C}" type="datetimeFigureOut">
               <a:rPr lang="en-US" smtClean="0"/>
               <a:pPr/>
-              <a:t>12.04.03</a:t>
+              <a:t>12.04.04</a:t>
             </a:fld>
             <a:endParaRPr lang="en-US"/>
           </a:p>
@@ -2871,7 +2874,7 @@
             <a:fld id="{26F449B0-83EA-4872-896A-89F03A2C0A3C}" type="datetimeFigureOut">
               <a:rPr lang="en-US" smtClean="0"/>
               <a:pPr/>
-              <a:t>12.04.03</a:t>
+              <a:t>12.04.04</a:t>
             </a:fld>
             <a:endParaRPr lang="en-US"/>
           </a:p>
@@ -3118,7 +3121,7 @@
             <a:fld id="{26F449B0-83EA-4872-896A-89F03A2C0A3C}" type="datetimeFigureOut">
               <a:rPr lang="en-US" smtClean="0"/>
               <a:pPr/>
-              <a:t>12.04.03</a:t>
+              <a:t>12.04.04</a:t>
             </a:fld>
             <a:endParaRPr lang="en-US"/>
           </a:p>
@@ -3364,7 +3367,7 @@
             <a:fld id="{26F449B0-83EA-4872-896A-89F03A2C0A3C}" type="datetimeFigureOut">
               <a:rPr lang="en-US" smtClean="0"/>
               <a:pPr/>
-              <a:t>12.04.03</a:t>
+              <a:t>12.04.04</a:t>
             </a:fld>
             <a:endParaRPr lang="en-US"/>
           </a:p>
@@ -4190,7 +4193,7 @@
             <a:fld id="{26F449B0-83EA-4872-896A-89F03A2C0A3C}" type="datetimeFigureOut">
               <a:rPr lang="en-US" smtClean="0"/>
               <a:pPr/>
-              <a:t>12.04.03</a:t>
+              <a:t>12.04.04</a:t>
             </a:fld>
             <a:endParaRPr lang="en-US"/>
           </a:p>
@@ -4647,21 +4650,8 @@
             <a:pPr algn="ctr"/>
             <a:r>
               <a:rPr lang="en-US" sz="2800" dirty="0" smtClean="0"/>
-              <a:t>GUI </a:t>
-            </a:r>
-            <a:r>
-              <a:rPr lang="en-US" sz="2800" dirty="0" smtClean="0"/>
-              <a:t>design and </a:t>
-            </a:r>
-            <a:r>
-              <a:rPr lang="en-US" sz="2800" dirty="0" smtClean="0"/>
-              <a:t>C</a:t>
-            </a:r>
-            <a:r>
-              <a:rPr lang="en-US" sz="2800" dirty="0" smtClean="0"/>
-              <a:t>lass design</a:t>
-            </a:r>
-            <a:endParaRPr lang="en-US" sz="2800" dirty="0" smtClean="0"/>
+              <a:t>GUI design and Class design</a:t>
+            </a:r>
           </a:p>
           <a:p>
             <a:pPr algn="ctr"/>
@@ -4777,17 +4767,8 @@
             </a:pPr>
             <a:r>
               <a:rPr lang="en-US" dirty="0" smtClean="0"/>
-              <a:t>3.b. </a:t>
-            </a:r>
-            <a:r>
-              <a:rPr lang="en-US" dirty="0" smtClean="0"/>
-              <a:t>Play </a:t>
-            </a:r>
-            <a:r>
-              <a:rPr lang="en-US" dirty="0" smtClean="0"/>
-              <a:t>(Multiplayer):</a:t>
-            </a:r>
-            <a:endParaRPr lang="en-US" dirty="0" smtClean="0"/>
+              <a:t>3.b. Play (Multiplayer):</a:t>
+            </a:r>
           </a:p>
           <a:p>
             <a:pPr lvl="1"/>
@@ -4810,7 +4791,6 @@
               <a:rPr lang="en-US" dirty="0" smtClean="0"/>
               <a:t>Solve all node’s right number from your opponent in time!</a:t>
             </a:r>
-            <a:endParaRPr lang="en-US" dirty="0" smtClean="0"/>
           </a:p>
         </p:txBody>
       </p:sp>
@@ -4921,7 +4901,6 @@
               <a:rPr lang="en-US" dirty="0" smtClean="0"/>
               <a:t>1. Start Sudoku</a:t>
             </a:r>
-            <a:endParaRPr lang="en-US" dirty="0" smtClean="0"/>
           </a:p>
           <a:p>
             <a:pPr marL="624078" indent="-514350">
@@ -5290,7 +5269,6 @@
               <a:rPr lang="en-US" dirty="0" smtClean="0"/>
               <a:t>4. Sudoku - Multiplayer: LAN</a:t>
             </a:r>
-            <a:endParaRPr lang="en-US" dirty="0" smtClean="0"/>
           </a:p>
           <a:p>
             <a:pPr>
@@ -5446,15 +5424,7 @@
             </a:pPr>
             <a:r>
               <a:rPr lang="en-US" sz="2800" dirty="0" smtClean="0"/>
-              <a:t>5. </a:t>
-            </a:r>
-            <a:r>
-              <a:rPr lang="en-US" sz="2800" dirty="0" smtClean="0"/>
-              <a:t>LAN – Create game: </a:t>
-            </a:r>
-            <a:r>
-              <a:rPr lang="en-US" sz="2800" dirty="0" smtClean="0"/>
-              <a:t>Create game </a:t>
+              <a:t>5. LAN – Create game: Create game </a:t>
             </a:r>
           </a:p>
           <a:p>
@@ -5577,7 +5547,6 @@
               <a:rPr lang="en-US" dirty="0" smtClean="0"/>
               <a:t>6. LAN - Join game: Joining </a:t>
             </a:r>
-            <a:endParaRPr lang="en-US" dirty="0" smtClean="0"/>
           </a:p>
           <a:p>
             <a:pPr>
@@ -5854,11 +5823,7 @@
             </a:pPr>
             <a:r>
               <a:rPr lang="en-US" dirty="0" smtClean="0"/>
-              <a:t>8</a:t>
-            </a:r>
-            <a:r>
-              <a:rPr lang="en-US" dirty="0" smtClean="0"/>
-              <a:t>. Host game – Start, Joining – Ready:</a:t>
+              <a:t>8. Host game – Start, Joining – Ready:</a:t>
             </a:r>
           </a:p>
           <a:p>
@@ -5869,7 +5834,6 @@
               <a:rPr lang="en-US" dirty="0" smtClean="0"/>
               <a:t>Sudoku multiplayer</a:t>
             </a:r>
-            <a:endParaRPr lang="en-US" dirty="0" smtClean="0"/>
           </a:p>
           <a:p>
             <a:pPr>
@@ -5992,11 +5956,7 @@
             </a:pPr>
             <a:r>
               <a:rPr lang="en-US" dirty="0" smtClean="0"/>
-              <a:t>9</a:t>
-            </a:r>
-            <a:r>
-              <a:rPr lang="en-US" dirty="0" smtClean="0"/>
-              <a:t>. Sudoku - Options: Options</a:t>
+              <a:t>9. Sudoku - Options: Options</a:t>
             </a:r>
             <a:endParaRPr lang="en-US" dirty="0"/>
           </a:p>
@@ -6289,7 +6249,12 @@
             <p:ph type="title"/>
           </p:nvPr>
         </p:nvSpPr>
-        <p:spPr/>
+        <p:spPr>
+          <a:xfrm>
+            <a:off x="457200" y="609600"/>
+            <a:ext cx="8229600" cy="1066800"/>
+          </a:xfrm>
+        </p:spPr>
         <p:txBody>
           <a:bodyPr/>
           <a:lstStyle/>
@@ -6297,36 +6262,35 @@
             <a:pPr algn="ctr"/>
             <a:r>
               <a:rPr lang="en-US" dirty="0" smtClean="0"/>
-              <a:t>Class design</a:t>
+              <a:t> 	Class design</a:t>
             </a:r>
             <a:endParaRPr lang="en-US" dirty="0"/>
           </a:p>
         </p:txBody>
       </p:sp>
-      <p:sp>
-        <p:nvSpPr>
-          <p:cNvPr id="3" name="Content Placeholder 2"/>
-          <p:cNvSpPr>
-            <a:spLocks noGrp="1"/>
-          </p:cNvSpPr>
+      <p:pic>
+        <p:nvPicPr>
+          <p:cNvPr id="4" name="Content Placeholder 3" descr="Class design.png"/>
+          <p:cNvPicPr>
+            <a:picLocks noGrp="1" noChangeAspect="1"/>
+          </p:cNvPicPr>
           <p:nvPr>
             <p:ph idx="1"/>
           </p:nvPr>
-        </p:nvSpPr>
-        <p:spPr>
-          <a:xfrm>
-            <a:off x="457200" y="2249424"/>
-            <a:ext cx="8229600" cy="1636776"/>
-          </a:xfrm>
-        </p:spPr>
-        <p:txBody>
-          <a:bodyPr/>
-          <a:lstStyle/>
-          <a:p>
-            <a:endParaRPr lang="en-US" dirty="0"/>
-          </a:p>
-        </p:txBody>
-      </p:sp>
+        </p:nvPicPr>
+        <p:blipFill>
+          <a:blip r:embed="rId2" cstate="print"/>
+          <a:stretch>
+            <a:fillRect/>
+          </a:stretch>
+        </p:blipFill>
+        <p:spPr>
+          <a:xfrm>
+            <a:off x="914400" y="1447800"/>
+            <a:ext cx="8229600" cy="5232400"/>
+          </a:xfrm>
+        </p:spPr>
+      </p:pic>
     </p:spTree>
   </p:cSld>
   <p:clrMapOvr>
@@ -6422,6 +6386,28 @@
               <a:defRPr/>
             </a:pPr>
             <a:r>
+              <a:rPr lang="en-US" sz="4000" smtClean="0">
+                <a:solidFill>
+                  <a:schemeClr val="tx2"/>
+                </a:solidFill>
+                <a:latin typeface="+mj-lt"/>
+                <a:ea typeface="+mj-ea"/>
+                <a:cs typeface="+mj-cs"/>
+              </a:rPr>
+              <a:t>Thanks </a:t>
+            </a:r>
+            <a:r>
+              <a:rPr lang="en-US" sz="4000" smtClean="0">
+                <a:solidFill>
+                  <a:schemeClr val="tx2"/>
+                </a:solidFill>
+                <a:latin typeface="+mj-lt"/>
+                <a:ea typeface="+mj-ea"/>
+                <a:cs typeface="+mj-cs"/>
+              </a:rPr>
+              <a:t>for your </a:t>
+            </a:r>
+            <a:r>
               <a:rPr lang="en-US" sz="4000" dirty="0" smtClean="0">
                 <a:solidFill>
                   <a:schemeClr val="tx2"/>
@@ -6430,7 +6416,7 @@
                 <a:ea typeface="+mj-ea"/>
                 <a:cs typeface="+mj-cs"/>
               </a:rPr>
-              <a:t>Thanks for attention</a:t>
+              <a:t>attention</a:t>
             </a:r>
             <a:endParaRPr kumimoji="0" lang="en-US" sz="4000" b="0" i="0" u="none" strike="noStrike" kern="1200" cap="none" spc="0" normalizeH="0" baseline="0" noProof="0" dirty="0">
               <a:ln>
@@ -6797,11 +6783,7 @@
             <a:pPr lvl="1"/>
             <a:r>
               <a:rPr lang="en-US" dirty="0" smtClean="0"/>
-              <a:t>S</a:t>
-            </a:r>
-            <a:r>
-              <a:rPr lang="en-US" dirty="0" smtClean="0"/>
-              <a:t>elect player or add a new player</a:t>
+              <a:t>Select player or add a new player</a:t>
             </a:r>
           </a:p>
           <a:p>
@@ -6810,7 +6792,6 @@
               <a:rPr lang="en-US" dirty="0" smtClean="0"/>
               <a:t>Click on Play</a:t>
             </a:r>
-            <a:endParaRPr lang="en-US" dirty="0" smtClean="0"/>
           </a:p>
           <a:p>
             <a:pPr>
@@ -7276,17 +7257,12 @@
               <a:rPr lang="en-US" dirty="0" smtClean="0"/>
               <a:t>5. Create Game:</a:t>
             </a:r>
-            <a:endParaRPr lang="en-US" dirty="0" smtClean="0"/>
           </a:p>
           <a:p>
             <a:pPr lvl="1"/>
             <a:r>
               <a:rPr lang="en-US" dirty="0" smtClean="0"/>
-              <a:t>Enter </a:t>
-            </a:r>
-            <a:r>
-              <a:rPr lang="en-US" dirty="0" smtClean="0"/>
-              <a:t>game name</a:t>
+              <a:t>Enter game name</a:t>
             </a:r>
           </a:p>
           <a:p>
@@ -7313,7 +7289,6 @@
               <a:rPr lang="en-US" dirty="0" smtClean="0"/>
               <a:t>Click on Start button</a:t>
             </a:r>
-            <a:endParaRPr lang="en-US" dirty="0" smtClean="0"/>
           </a:p>
         </p:txBody>
       </p:sp>
@@ -7447,13 +7422,8 @@
             </a:pPr>
             <a:r>
               <a:rPr lang="en-US" dirty="0" smtClean="0"/>
-              <a:t>5. </a:t>
-            </a:r>
-            <a:r>
-              <a:rPr lang="en-US" dirty="0" smtClean="0"/>
-              <a:t>Host:</a:t>
-            </a:r>
-            <a:endParaRPr lang="en-US" dirty="0" smtClean="0"/>
+              <a:t>5. Host:</a:t>
+            </a:r>
           </a:p>
           <a:p>
             <a:pPr lvl="1"/>
@@ -7475,7 +7445,6 @@
               <a:rPr lang="en-US" dirty="0" smtClean="0"/>
               <a:t>Click on Start button</a:t>
             </a:r>
-            <a:endParaRPr lang="en-US" dirty="0" smtClean="0"/>
           </a:p>
         </p:txBody>
       </p:sp>
@@ -7609,13 +7578,8 @@
             </a:pPr>
             <a:r>
               <a:rPr lang="en-US" dirty="0" smtClean="0"/>
-              <a:t>5. </a:t>
-            </a:r>
-            <a:r>
-              <a:rPr lang="en-US" dirty="0" smtClean="0"/>
-              <a:t>Join:</a:t>
-            </a:r>
-            <a:endParaRPr lang="en-US" dirty="0" smtClean="0"/>
+              <a:t>5. Join:</a:t>
+            </a:r>
           </a:p>
           <a:p>
             <a:pPr lvl="1"/>
@@ -7628,11 +7592,7 @@
             <a:pPr lvl="1"/>
             <a:r>
               <a:rPr lang="en-US" dirty="0" smtClean="0"/>
-              <a:t>Select and join in available game from </a:t>
-            </a:r>
-            <a:r>
-              <a:rPr lang="en-US" dirty="0" smtClean="0"/>
-              <a:t>list</a:t>
+              <a:t>Select and join in available game from list</a:t>
             </a:r>
           </a:p>
           <a:p>

</xml_diff>